<commit_message>
analytical model for WPT presentation are prepared
The quality factor and mutual inductance calculation
</commit_message>
<xml_diff>
--- a/Reports/WPT/Coupling3.pptx
+++ b/Reports/WPT/Coupling3.pptx
@@ -130,6 +130,11 @@
       </a:defRPr>
     </a:lvl9pPr>
   </p:defaultTextStyle>
+  <p:extLst>
+    <p:ext uri="{EFAFB233-063F-42B5-8137-9DF3F51BA10A}">
+      <p15:sldGuideLst xmlns:p15="http://schemas.microsoft.com/office/powerpoint/2012/main"/>
+    </p:ext>
+  </p:extLst>
 </p:presentation>
 </file>
 
@@ -280,7 +285,7 @@
           <a:p>
             <a:fld id="{9A15E861-F5B1-46B8-8E16-63FB47DBF585}" type="datetimeFigureOut">
               <a:rPr lang="en-US" smtClean="0"/>
-              <a:t>4/14/2020</a:t>
+              <a:t>4/20/2020</a:t>
             </a:fld>
             <a:endParaRPr lang="en-US"/>
           </a:p>
@@ -478,7 +483,7 @@
           <a:p>
             <a:fld id="{9A15E861-F5B1-46B8-8E16-63FB47DBF585}" type="datetimeFigureOut">
               <a:rPr lang="en-US" smtClean="0"/>
-              <a:t>4/14/2020</a:t>
+              <a:t>4/20/2020</a:t>
             </a:fld>
             <a:endParaRPr lang="en-US"/>
           </a:p>
@@ -686,7 +691,7 @@
           <a:p>
             <a:fld id="{9A15E861-F5B1-46B8-8E16-63FB47DBF585}" type="datetimeFigureOut">
               <a:rPr lang="en-US" smtClean="0"/>
-              <a:t>4/14/2020</a:t>
+              <a:t>4/20/2020</a:t>
             </a:fld>
             <a:endParaRPr lang="en-US"/>
           </a:p>
@@ -884,7 +889,7 @@
           <a:p>
             <a:fld id="{9A15E861-F5B1-46B8-8E16-63FB47DBF585}" type="datetimeFigureOut">
               <a:rPr lang="en-US" smtClean="0"/>
-              <a:t>4/14/2020</a:t>
+              <a:t>4/20/2020</a:t>
             </a:fld>
             <a:endParaRPr lang="en-US"/>
           </a:p>
@@ -1159,7 +1164,7 @@
           <a:p>
             <a:fld id="{9A15E861-F5B1-46B8-8E16-63FB47DBF585}" type="datetimeFigureOut">
               <a:rPr lang="en-US" smtClean="0"/>
-              <a:t>4/14/2020</a:t>
+              <a:t>4/20/2020</a:t>
             </a:fld>
             <a:endParaRPr lang="en-US"/>
           </a:p>
@@ -1424,7 +1429,7 @@
           <a:p>
             <a:fld id="{9A15E861-F5B1-46B8-8E16-63FB47DBF585}" type="datetimeFigureOut">
               <a:rPr lang="en-US" smtClean="0"/>
-              <a:t>4/14/2020</a:t>
+              <a:t>4/20/2020</a:t>
             </a:fld>
             <a:endParaRPr lang="en-US"/>
           </a:p>
@@ -1836,7 +1841,7 @@
           <a:p>
             <a:fld id="{9A15E861-F5B1-46B8-8E16-63FB47DBF585}" type="datetimeFigureOut">
               <a:rPr lang="en-US" smtClean="0"/>
-              <a:t>4/14/2020</a:t>
+              <a:t>4/20/2020</a:t>
             </a:fld>
             <a:endParaRPr lang="en-US"/>
           </a:p>
@@ -1977,7 +1982,7 @@
           <a:p>
             <a:fld id="{9A15E861-F5B1-46B8-8E16-63FB47DBF585}" type="datetimeFigureOut">
               <a:rPr lang="en-US" smtClean="0"/>
-              <a:t>4/14/2020</a:t>
+              <a:t>4/20/2020</a:t>
             </a:fld>
             <a:endParaRPr lang="en-US"/>
           </a:p>
@@ -2090,7 +2095,7 @@
           <a:p>
             <a:fld id="{9A15E861-F5B1-46B8-8E16-63FB47DBF585}" type="datetimeFigureOut">
               <a:rPr lang="en-US" smtClean="0"/>
-              <a:t>4/14/2020</a:t>
+              <a:t>4/20/2020</a:t>
             </a:fld>
             <a:endParaRPr lang="en-US"/>
           </a:p>
@@ -2401,7 +2406,7 @@
           <a:p>
             <a:fld id="{9A15E861-F5B1-46B8-8E16-63FB47DBF585}" type="datetimeFigureOut">
               <a:rPr lang="en-US" smtClean="0"/>
-              <a:t>4/14/2020</a:t>
+              <a:t>4/20/2020</a:t>
             </a:fld>
             <a:endParaRPr lang="en-US"/>
           </a:p>
@@ -2689,7 +2694,7 @@
           <a:p>
             <a:fld id="{9A15E861-F5B1-46B8-8E16-63FB47DBF585}" type="datetimeFigureOut">
               <a:rPr lang="en-US" smtClean="0"/>
-              <a:t>4/14/2020</a:t>
+              <a:t>4/20/2020</a:t>
             </a:fld>
             <a:endParaRPr lang="en-US"/>
           </a:p>
@@ -2930,7 +2935,7 @@
           <a:p>
             <a:fld id="{9A15E861-F5B1-46B8-8E16-63FB47DBF585}" type="datetimeFigureOut">
               <a:rPr lang="en-US" smtClean="0"/>
-              <a:t>4/14/2020</a:t>
+              <a:t>4/20/2020</a:t>
             </a:fld>
             <a:endParaRPr lang="en-US"/>
           </a:p>
@@ -3394,8 +3399,8 @@
           </a:extLst>
         </p:spPr>
       </p:pic>
-      <mc:AlternateContent xmlns:mc="http://schemas.openxmlformats.org/markup-compatibility/2006">
-        <mc:Choice xmlns:a14="http://schemas.microsoft.com/office/drawing/2010/main" Requires="a14">
+      <mc:AlternateContent xmlns:mc="http://schemas.openxmlformats.org/markup-compatibility/2006" xmlns:a14="http://schemas.microsoft.com/office/drawing/2010/main">
+        <mc:Choice Requires="a14">
           <p:sp>
             <p:nvSpPr>
               <p:cNvPr id="6" name="TextBox 5">
@@ -3464,7 +3469,7 @@
             </p:txBody>
           </p:sp>
         </mc:Choice>
-        <mc:Fallback>
+        <mc:Fallback xmlns="">
           <p:sp>
             <p:nvSpPr>
               <p:cNvPr id="6" name="TextBox 5">
@@ -3509,8 +3514,8 @@
           </p:sp>
         </mc:Fallback>
       </mc:AlternateContent>
-      <mc:AlternateContent xmlns:mc="http://schemas.openxmlformats.org/markup-compatibility/2006">
-        <mc:Choice xmlns:a14="http://schemas.microsoft.com/office/drawing/2010/main" Requires="a14">
+      <mc:AlternateContent xmlns:mc="http://schemas.openxmlformats.org/markup-compatibility/2006" xmlns:a14="http://schemas.microsoft.com/office/drawing/2010/main">
+        <mc:Choice Requires="a14">
           <p:sp>
             <p:nvSpPr>
               <p:cNvPr id="7" name="TextBox 6">
@@ -3579,7 +3584,7 @@
             </p:txBody>
           </p:sp>
         </mc:Choice>
-        <mc:Fallback>
+        <mc:Fallback xmlns="">
           <p:sp>
             <p:nvSpPr>
               <p:cNvPr id="7" name="TextBox 6">
@@ -3624,8 +3629,8 @@
           </p:sp>
         </mc:Fallback>
       </mc:AlternateContent>
-      <mc:AlternateContent xmlns:mc="http://schemas.openxmlformats.org/markup-compatibility/2006">
-        <mc:Choice xmlns:a14="http://schemas.microsoft.com/office/drawing/2010/main" Requires="a14">
+      <mc:AlternateContent xmlns:mc="http://schemas.openxmlformats.org/markup-compatibility/2006" xmlns:a14="http://schemas.microsoft.com/office/drawing/2010/main">
+        <mc:Choice Requires="a14">
           <p:sp>
             <p:nvSpPr>
               <p:cNvPr id="8" name="TextBox 7">
@@ -3731,7 +3736,7 @@
             </p:txBody>
           </p:sp>
         </mc:Choice>
-        <mc:Fallback>
+        <mc:Fallback xmlns="">
           <p:sp>
             <p:nvSpPr>
               <p:cNvPr id="8" name="TextBox 7">
@@ -3776,8 +3781,8 @@
           </p:sp>
         </mc:Fallback>
       </mc:AlternateContent>
-      <mc:AlternateContent xmlns:mc="http://schemas.openxmlformats.org/markup-compatibility/2006">
-        <mc:Choice xmlns:a14="http://schemas.microsoft.com/office/drawing/2010/main" Requires="a14">
+      <mc:AlternateContent xmlns:mc="http://schemas.openxmlformats.org/markup-compatibility/2006" xmlns:a14="http://schemas.microsoft.com/office/drawing/2010/main">
+        <mc:Choice Requires="a14">
           <p:sp>
             <p:nvSpPr>
               <p:cNvPr id="9" name="TextBox 8">
@@ -3883,7 +3888,7 @@
             </p:txBody>
           </p:sp>
         </mc:Choice>
-        <mc:Fallback>
+        <mc:Fallback xmlns="">
           <p:sp>
             <p:nvSpPr>
               <p:cNvPr id="9" name="TextBox 8">
@@ -3928,8 +3933,8 @@
           </p:sp>
         </mc:Fallback>
       </mc:AlternateContent>
-      <mc:AlternateContent xmlns:mc="http://schemas.openxmlformats.org/markup-compatibility/2006">
-        <mc:Choice xmlns:a14="http://schemas.microsoft.com/office/drawing/2010/main" Requires="a14">
+      <mc:AlternateContent xmlns:mc="http://schemas.openxmlformats.org/markup-compatibility/2006" xmlns:a14="http://schemas.microsoft.com/office/drawing/2010/main">
+        <mc:Choice Requires="a14">
           <p:sp>
             <p:nvSpPr>
               <p:cNvPr id="10" name="TextBox 9">
@@ -3998,7 +4003,7 @@
             </p:txBody>
           </p:sp>
         </mc:Choice>
-        <mc:Fallback>
+        <mc:Fallback xmlns="">
           <p:sp>
             <p:nvSpPr>
               <p:cNvPr id="10" name="TextBox 9">
@@ -4461,8 +4466,8 @@
           </a:extLst>
         </p:spPr>
       </p:pic>
-      <mc:AlternateContent xmlns:mc="http://schemas.openxmlformats.org/markup-compatibility/2006">
-        <mc:Choice xmlns:a14="http://schemas.microsoft.com/office/drawing/2010/main" Requires="a14">
+      <mc:AlternateContent xmlns:mc="http://schemas.openxmlformats.org/markup-compatibility/2006" xmlns:a14="http://schemas.microsoft.com/office/drawing/2010/main">
+        <mc:Choice Requires="a14">
           <p:sp>
             <p:nvSpPr>
               <p:cNvPr id="5" name="TextBox 4">
@@ -4531,7 +4536,7 @@
             </p:txBody>
           </p:sp>
         </mc:Choice>
-        <mc:Fallback>
+        <mc:Fallback xmlns="">
           <p:sp>
             <p:nvSpPr>
               <p:cNvPr id="5" name="TextBox 4">
@@ -4576,8 +4581,8 @@
           </p:sp>
         </mc:Fallback>
       </mc:AlternateContent>
-      <mc:AlternateContent xmlns:mc="http://schemas.openxmlformats.org/markup-compatibility/2006">
-        <mc:Choice xmlns:a14="http://schemas.microsoft.com/office/drawing/2010/main" Requires="a14">
+      <mc:AlternateContent xmlns:mc="http://schemas.openxmlformats.org/markup-compatibility/2006" xmlns:a14="http://schemas.microsoft.com/office/drawing/2010/main">
+        <mc:Choice Requires="a14">
           <p:sp>
             <p:nvSpPr>
               <p:cNvPr id="6" name="TextBox 5">
@@ -4646,7 +4651,7 @@
             </p:txBody>
           </p:sp>
         </mc:Choice>
-        <mc:Fallback>
+        <mc:Fallback xmlns="">
           <p:sp>
             <p:nvSpPr>
               <p:cNvPr id="6" name="TextBox 5">
@@ -4691,8 +4696,8 @@
           </p:sp>
         </mc:Fallback>
       </mc:AlternateContent>
-      <mc:AlternateContent xmlns:mc="http://schemas.openxmlformats.org/markup-compatibility/2006">
-        <mc:Choice xmlns:a14="http://schemas.microsoft.com/office/drawing/2010/main" Requires="a14">
+      <mc:AlternateContent xmlns:mc="http://schemas.openxmlformats.org/markup-compatibility/2006" xmlns:a14="http://schemas.microsoft.com/office/drawing/2010/main">
+        <mc:Choice Requires="a14">
           <p:sp>
             <p:nvSpPr>
               <p:cNvPr id="7" name="TextBox 6">
@@ -4761,7 +4766,7 @@
             </p:txBody>
           </p:sp>
         </mc:Choice>
-        <mc:Fallback>
+        <mc:Fallback xmlns="">
           <p:sp>
             <p:nvSpPr>
               <p:cNvPr id="7" name="TextBox 6">
@@ -4806,8 +4811,8 @@
           </p:sp>
         </mc:Fallback>
       </mc:AlternateContent>
-      <mc:AlternateContent xmlns:mc="http://schemas.openxmlformats.org/markup-compatibility/2006">
-        <mc:Choice xmlns:a14="http://schemas.microsoft.com/office/drawing/2010/main" Requires="a14">
+      <mc:AlternateContent xmlns:mc="http://schemas.openxmlformats.org/markup-compatibility/2006" xmlns:a14="http://schemas.microsoft.com/office/drawing/2010/main">
+        <mc:Choice Requires="a14">
           <p:sp>
             <p:nvSpPr>
               <p:cNvPr id="8" name="TextBox 7">
@@ -4885,7 +4890,7 @@
             </p:txBody>
           </p:sp>
         </mc:Choice>
-        <mc:Fallback>
+        <mc:Fallback xmlns="">
           <p:sp>
             <p:nvSpPr>
               <p:cNvPr id="8" name="TextBox 7">
@@ -4930,8 +4935,8 @@
           </p:sp>
         </mc:Fallback>
       </mc:AlternateContent>
-      <mc:AlternateContent xmlns:mc="http://schemas.openxmlformats.org/markup-compatibility/2006">
-        <mc:Choice xmlns:a14="http://schemas.microsoft.com/office/drawing/2010/main" Requires="a14">
+      <mc:AlternateContent xmlns:mc="http://schemas.openxmlformats.org/markup-compatibility/2006" xmlns:a14="http://schemas.microsoft.com/office/drawing/2010/main">
+        <mc:Choice Requires="a14">
           <p:sp>
             <p:nvSpPr>
               <p:cNvPr id="9" name="TextBox 8">
@@ -5006,7 +5011,7 @@
             </p:txBody>
           </p:sp>
         </mc:Choice>
-        <mc:Fallback>
+        <mc:Fallback xmlns="">
           <p:sp>
             <p:nvSpPr>
               <p:cNvPr id="9" name="TextBox 8">
@@ -5051,8 +5056,8 @@
           </p:sp>
         </mc:Fallback>
       </mc:AlternateContent>
-      <mc:AlternateContent xmlns:mc="http://schemas.openxmlformats.org/markup-compatibility/2006">
-        <mc:Choice xmlns:a14="http://schemas.microsoft.com/office/drawing/2010/main" Requires="a14">
+      <mc:AlternateContent xmlns:mc="http://schemas.openxmlformats.org/markup-compatibility/2006" xmlns:a14="http://schemas.microsoft.com/office/drawing/2010/main">
+        <mc:Choice Requires="a14">
           <p:sp>
             <p:nvSpPr>
               <p:cNvPr id="10" name="TextBox 9">
@@ -5127,7 +5132,7 @@
             </p:txBody>
           </p:sp>
         </mc:Choice>
-        <mc:Fallback>
+        <mc:Fallback xmlns="">
           <p:sp>
             <p:nvSpPr>
               <p:cNvPr id="10" name="TextBox 9">
@@ -5172,8 +5177,8 @@
           </p:sp>
         </mc:Fallback>
       </mc:AlternateContent>
-      <mc:AlternateContent xmlns:mc="http://schemas.openxmlformats.org/markup-compatibility/2006">
-        <mc:Choice xmlns:a14="http://schemas.microsoft.com/office/drawing/2010/main" Requires="a14">
+      <mc:AlternateContent xmlns:mc="http://schemas.openxmlformats.org/markup-compatibility/2006" xmlns:a14="http://schemas.microsoft.com/office/drawing/2010/main">
+        <mc:Choice Requires="a14">
           <p:sp>
             <p:nvSpPr>
               <p:cNvPr id="11" name="TextBox 10">
@@ -5279,7 +5284,7 @@
             </p:txBody>
           </p:sp>
         </mc:Choice>
-        <mc:Fallback>
+        <mc:Fallback xmlns="">
           <p:sp>
             <p:nvSpPr>
               <p:cNvPr id="11" name="TextBox 10">
@@ -5363,8 +5368,8 @@
           </a:fontRef>
         </p:style>
       </p:cxnSp>
-      <mc:AlternateContent xmlns:mc="http://schemas.openxmlformats.org/markup-compatibility/2006">
-        <mc:Choice xmlns:a14="http://schemas.microsoft.com/office/drawing/2010/main" Requires="a14">
+      <mc:AlternateContent xmlns:mc="http://schemas.openxmlformats.org/markup-compatibility/2006" xmlns:a14="http://schemas.microsoft.com/office/drawing/2010/main">
+        <mc:Choice Requires="a14">
           <p:sp>
             <p:nvSpPr>
               <p:cNvPr id="13" name="TextBox 12">
@@ -5476,7 +5481,7 @@
             </p:txBody>
           </p:sp>
         </mc:Choice>
-        <mc:Fallback>
+        <mc:Fallback xmlns="">
           <p:sp>
             <p:nvSpPr>
               <p:cNvPr id="13" name="TextBox 12">
@@ -5838,8 +5843,8 @@
           </a:extLst>
         </p:spPr>
       </p:pic>
-      <mc:AlternateContent xmlns:mc="http://schemas.openxmlformats.org/markup-compatibility/2006">
-        <mc:Choice xmlns:a14="http://schemas.microsoft.com/office/drawing/2010/main" Requires="a14">
+      <mc:AlternateContent xmlns:mc="http://schemas.openxmlformats.org/markup-compatibility/2006" xmlns:a14="http://schemas.microsoft.com/office/drawing/2010/main">
+        <mc:Choice Requires="a14">
           <p:sp>
             <p:nvSpPr>
               <p:cNvPr id="3" name="TextBox 2">
@@ -5908,7 +5913,7 @@
             </p:txBody>
           </p:sp>
         </mc:Choice>
-        <mc:Fallback>
+        <mc:Fallback xmlns="">
           <p:sp>
             <p:nvSpPr>
               <p:cNvPr id="3" name="TextBox 2">
@@ -5953,8 +5958,8 @@
           </p:sp>
         </mc:Fallback>
       </mc:AlternateContent>
-      <mc:AlternateContent xmlns:mc="http://schemas.openxmlformats.org/markup-compatibility/2006">
-        <mc:Choice xmlns:a14="http://schemas.microsoft.com/office/drawing/2010/main" Requires="a14">
+      <mc:AlternateContent xmlns:mc="http://schemas.openxmlformats.org/markup-compatibility/2006" xmlns:a14="http://schemas.microsoft.com/office/drawing/2010/main">
+        <mc:Choice Requires="a14">
           <p:sp>
             <p:nvSpPr>
               <p:cNvPr id="4" name="TextBox 3">
@@ -6023,7 +6028,7 @@
             </p:txBody>
           </p:sp>
         </mc:Choice>
-        <mc:Fallback>
+        <mc:Fallback xmlns="">
           <p:sp>
             <p:nvSpPr>
               <p:cNvPr id="4" name="TextBox 3">
@@ -6068,8 +6073,8 @@
           </p:sp>
         </mc:Fallback>
       </mc:AlternateContent>
-      <mc:AlternateContent xmlns:mc="http://schemas.openxmlformats.org/markup-compatibility/2006">
-        <mc:Choice xmlns:a14="http://schemas.microsoft.com/office/drawing/2010/main" Requires="a14">
+      <mc:AlternateContent xmlns:mc="http://schemas.openxmlformats.org/markup-compatibility/2006" xmlns:a14="http://schemas.microsoft.com/office/drawing/2010/main">
+        <mc:Choice Requires="a14">
           <p:sp>
             <p:nvSpPr>
               <p:cNvPr id="5" name="TextBox 4">
@@ -6181,7 +6186,7 @@
             </p:txBody>
           </p:sp>
         </mc:Choice>
-        <mc:Fallback>
+        <mc:Fallback xmlns="">
           <p:sp>
             <p:nvSpPr>
               <p:cNvPr id="5" name="TextBox 4">
@@ -6226,8 +6231,8 @@
           </p:sp>
         </mc:Fallback>
       </mc:AlternateContent>
-      <mc:AlternateContent xmlns:mc="http://schemas.openxmlformats.org/markup-compatibility/2006">
-        <mc:Choice xmlns:a14="http://schemas.microsoft.com/office/drawing/2010/main" Requires="a14">
+      <mc:AlternateContent xmlns:mc="http://schemas.openxmlformats.org/markup-compatibility/2006" xmlns:a14="http://schemas.microsoft.com/office/drawing/2010/main">
+        <mc:Choice Requires="a14">
           <p:sp>
             <p:nvSpPr>
               <p:cNvPr id="6" name="TextBox 5">
@@ -6302,7 +6307,7 @@
             </p:txBody>
           </p:sp>
         </mc:Choice>
-        <mc:Fallback>
+        <mc:Fallback xmlns="">
           <p:sp>
             <p:nvSpPr>
               <p:cNvPr id="6" name="TextBox 5">
@@ -6347,8 +6352,8 @@
           </p:sp>
         </mc:Fallback>
       </mc:AlternateContent>
-      <mc:AlternateContent xmlns:mc="http://schemas.openxmlformats.org/markup-compatibility/2006">
-        <mc:Choice xmlns:a14="http://schemas.microsoft.com/office/drawing/2010/main" Requires="a14">
+      <mc:AlternateContent xmlns:mc="http://schemas.openxmlformats.org/markup-compatibility/2006" xmlns:a14="http://schemas.microsoft.com/office/drawing/2010/main">
+        <mc:Choice Requires="a14">
           <p:sp>
             <p:nvSpPr>
               <p:cNvPr id="7" name="TextBox 6">
@@ -6423,7 +6428,7 @@
             </p:txBody>
           </p:sp>
         </mc:Choice>
-        <mc:Fallback>
+        <mc:Fallback xmlns="">
           <p:sp>
             <p:nvSpPr>
               <p:cNvPr id="7" name="TextBox 6">
@@ -6468,8 +6473,8 @@
           </p:sp>
         </mc:Fallback>
       </mc:AlternateContent>
-      <mc:AlternateContent xmlns:mc="http://schemas.openxmlformats.org/markup-compatibility/2006">
-        <mc:Choice xmlns:a14="http://schemas.microsoft.com/office/drawing/2010/main" Requires="a14">
+      <mc:AlternateContent xmlns:mc="http://schemas.openxmlformats.org/markup-compatibility/2006" xmlns:a14="http://schemas.microsoft.com/office/drawing/2010/main">
+        <mc:Choice Requires="a14">
           <p:sp>
             <p:nvSpPr>
               <p:cNvPr id="8" name="TextBox 7">
@@ -6575,7 +6580,7 @@
             </p:txBody>
           </p:sp>
         </mc:Choice>
-        <mc:Fallback>
+        <mc:Fallback xmlns="">
           <p:sp>
             <p:nvSpPr>
               <p:cNvPr id="8" name="TextBox 7">
@@ -6620,8 +6625,8 @@
           </p:sp>
         </mc:Fallback>
       </mc:AlternateContent>
-      <mc:AlternateContent xmlns:mc="http://schemas.openxmlformats.org/markup-compatibility/2006">
-        <mc:Choice xmlns:a14="http://schemas.microsoft.com/office/drawing/2010/main" Requires="a14">
+      <mc:AlternateContent xmlns:mc="http://schemas.openxmlformats.org/markup-compatibility/2006" xmlns:a14="http://schemas.microsoft.com/office/drawing/2010/main">
+        <mc:Choice Requires="a14">
           <p:sp>
             <p:nvSpPr>
               <p:cNvPr id="9" name="TextBox 8">
@@ -6699,7 +6704,7 @@
             </p:txBody>
           </p:sp>
         </mc:Choice>
-        <mc:Fallback>
+        <mc:Fallback xmlns="">
           <p:sp>
             <p:nvSpPr>
               <p:cNvPr id="9" name="TextBox 8">
@@ -6744,8 +6749,8 @@
           </p:sp>
         </mc:Fallback>
       </mc:AlternateContent>
-      <mc:AlternateContent xmlns:mc="http://schemas.openxmlformats.org/markup-compatibility/2006">
-        <mc:Choice xmlns:a14="http://schemas.microsoft.com/office/drawing/2010/main" Requires="a14">
+      <mc:AlternateContent xmlns:mc="http://schemas.openxmlformats.org/markup-compatibility/2006" xmlns:a14="http://schemas.microsoft.com/office/drawing/2010/main">
+        <mc:Choice Requires="a14">
           <p:sp>
             <p:nvSpPr>
               <p:cNvPr id="10" name="TextBox 9">
@@ -6814,7 +6819,7 @@
             </p:txBody>
           </p:sp>
         </mc:Choice>
-        <mc:Fallback>
+        <mc:Fallback xmlns="">
           <p:sp>
             <p:nvSpPr>
               <p:cNvPr id="10" name="TextBox 9">
@@ -6930,8 +6935,8 @@
           <a:chExt cx="0" cy="0"/>
         </a:xfrm>
       </p:grpSpPr>
-      <mc:AlternateContent xmlns:mc="http://schemas.openxmlformats.org/markup-compatibility/2006">
-        <mc:Choice xmlns:a14="http://schemas.microsoft.com/office/drawing/2010/main" Requires="a14">
+      <mc:AlternateContent xmlns:mc="http://schemas.openxmlformats.org/markup-compatibility/2006" xmlns:a14="http://schemas.microsoft.com/office/drawing/2010/main">
+        <mc:Choice Requires="a14">
           <p:sp>
             <p:nvSpPr>
               <p:cNvPr id="5" name="TextBox 4">
@@ -7027,7 +7032,7 @@
             </p:txBody>
           </p:sp>
         </mc:Choice>
-        <mc:Fallback>
+        <mc:Fallback xmlns="">
           <p:sp>
             <p:nvSpPr>
               <p:cNvPr id="5" name="TextBox 4">
@@ -7590,8 +7595,8 @@
           </a:p>
         </p:txBody>
       </p:sp>
-      <mc:AlternateContent xmlns:mc="http://schemas.openxmlformats.org/markup-compatibility/2006">
-        <mc:Choice xmlns:a14="http://schemas.microsoft.com/office/drawing/2010/main" Requires="a14">
+      <mc:AlternateContent xmlns:mc="http://schemas.openxmlformats.org/markup-compatibility/2006" xmlns:a14="http://schemas.microsoft.com/office/drawing/2010/main">
+        <mc:Choice Requires="a14">
           <p:sp>
             <p:nvSpPr>
               <p:cNvPr id="13" name="TextBox 12">
@@ -7695,19 +7700,7 @@
                         <a:rPr lang="tr-TR" b="0" i="1" smtClean="0">
                           <a:latin typeface="Cambria Math" panose="02040503050406030204" pitchFamily="18" charset="0"/>
                         </a:rPr>
-                        <m:t>=</m:t>
-                      </m:r>
-                      <m:r>
-                        <a:rPr lang="tr-TR" b="0" i="1" smtClean="0">
-                          <a:latin typeface="Cambria Math" panose="02040503050406030204" pitchFamily="18" charset="0"/>
-                        </a:rPr>
-                        <m:t>−</m:t>
-                      </m:r>
-                      <m:r>
-                        <a:rPr lang="tr-TR" b="0" i="1" smtClean="0">
-                          <a:latin typeface="Cambria Math" panose="02040503050406030204" pitchFamily="18" charset="0"/>
-                        </a:rPr>
-                        <m:t>(</m:t>
+                        <m:t>=−(</m:t>
                       </m:r>
                       <m:r>
                         <a:rPr lang="tr-TR" b="0" i="1" smtClean="0">
@@ -7937,7 +7930,7 @@
             </p:txBody>
           </p:sp>
         </mc:Choice>
-        <mc:Fallback>
+        <mc:Fallback xmlns="">
           <p:sp>
             <p:nvSpPr>
               <p:cNvPr id="13" name="TextBox 12">
@@ -8938,8 +8931,8 @@
           <a:chExt cx="0" cy="0"/>
         </a:xfrm>
       </p:grpSpPr>
-      <mc:AlternateContent xmlns:mc="http://schemas.openxmlformats.org/markup-compatibility/2006">
-        <mc:Choice xmlns:a14="http://schemas.microsoft.com/office/drawing/2010/main" Requires="a14">
+      <mc:AlternateContent xmlns:mc="http://schemas.openxmlformats.org/markup-compatibility/2006" xmlns:a14="http://schemas.microsoft.com/office/drawing/2010/main">
+        <mc:Choice Requires="a14">
           <p:sp>
             <p:nvSpPr>
               <p:cNvPr id="4" name="TextBox 3">
@@ -9043,13 +9036,7 @@
                         <a:rPr lang="tr-TR" sz="1400" b="0" i="1" smtClean="0">
                           <a:latin typeface="Cambria Math" panose="02040503050406030204" pitchFamily="18" charset="0"/>
                         </a:rPr>
-                        <m:t>=</m:t>
-                      </m:r>
-                      <m:r>
-                        <a:rPr lang="tr-TR" sz="1400" b="0" i="1" smtClean="0">
-                          <a:latin typeface="Cambria Math" panose="02040503050406030204" pitchFamily="18" charset="0"/>
-                        </a:rPr>
-                        <m:t>−</m:t>
+                        <m:t>=−</m:t>
                       </m:r>
                       <m:r>
                         <a:rPr lang="tr-TR" sz="1400" b="0" i="1" smtClean="0">
@@ -9518,7 +9505,7 @@
             </p:txBody>
           </p:sp>
         </mc:Choice>
-        <mc:Fallback>
+        <mc:Fallback xmlns="">
           <p:sp>
             <p:nvSpPr>
               <p:cNvPr id="4" name="TextBox 3">
@@ -10251,8 +10238,8 @@
           </p:sp>
         </mc:Fallback>
       </mc:AlternateContent>
-      <mc:AlternateContent xmlns:mc="http://schemas.openxmlformats.org/markup-compatibility/2006">
-        <mc:Choice xmlns:a14="http://schemas.microsoft.com/office/drawing/2010/main" Requires="a14">
+      <mc:AlternateContent xmlns:mc="http://schemas.openxmlformats.org/markup-compatibility/2006" xmlns:a14="http://schemas.microsoft.com/office/drawing/2010/main">
+        <mc:Choice Requires="a14">
           <p:sp>
             <p:nvSpPr>
               <p:cNvPr id="7" name="TextBox 6">
@@ -10894,7 +10881,7 @@
             </p:txBody>
           </p:sp>
         </mc:Choice>
-        <mc:Fallback>
+        <mc:Fallback xmlns="">
           <p:sp>
             <p:nvSpPr>
               <p:cNvPr id="7" name="TextBox 6">
@@ -10969,8 +10956,8 @@
           <a:chExt cx="0" cy="0"/>
         </a:xfrm>
       </p:grpSpPr>
-      <mc:AlternateContent xmlns:mc="http://schemas.openxmlformats.org/markup-compatibility/2006">
-        <mc:Choice xmlns:a14="http://schemas.microsoft.com/office/drawing/2010/main" Requires="a14">
+      <mc:AlternateContent xmlns:mc="http://schemas.openxmlformats.org/markup-compatibility/2006" xmlns:a14="http://schemas.microsoft.com/office/drawing/2010/main">
+        <mc:Choice Requires="a14">
           <p:sp>
             <p:nvSpPr>
               <p:cNvPr id="4" name="TextBox 3">
@@ -11074,13 +11061,7 @@
                         <a:rPr lang="tr-TR" b="0" i="1" smtClean="0">
                           <a:latin typeface="Cambria Math" panose="02040503050406030204" pitchFamily="18" charset="0"/>
                         </a:rPr>
-                        <m:t>=</m:t>
-                      </m:r>
-                      <m:r>
-                        <a:rPr lang="tr-TR" b="0" i="1" smtClean="0">
-                          <a:latin typeface="Cambria Math" panose="02040503050406030204" pitchFamily="18" charset="0"/>
-                        </a:rPr>
-                        <m:t>−</m:t>
+                        <m:t>=−</m:t>
                       </m:r>
                       <m:r>
                         <a:rPr lang="tr-TR" b="0" i="1" smtClean="0">
@@ -11364,7 +11345,7 @@
             </p:txBody>
           </p:sp>
         </mc:Choice>
-        <mc:Fallback>
+        <mc:Fallback xmlns="">
           <p:sp>
             <p:nvSpPr>
               <p:cNvPr id="4" name="TextBox 3">
@@ -11409,8 +11390,8 @@
           </p:sp>
         </mc:Fallback>
       </mc:AlternateContent>
-      <mc:AlternateContent xmlns:mc="http://schemas.openxmlformats.org/markup-compatibility/2006">
-        <mc:Choice xmlns:a14="http://schemas.microsoft.com/office/drawing/2010/main" Requires="a14">
+      <mc:AlternateContent xmlns:mc="http://schemas.openxmlformats.org/markup-compatibility/2006" xmlns:a14="http://schemas.microsoft.com/office/drawing/2010/main">
+        <mc:Choice Requires="a14">
           <p:sp>
             <p:nvSpPr>
               <p:cNvPr id="5" name="TextBox 4">
@@ -11746,7 +11727,7 @@
             </p:txBody>
           </p:sp>
         </mc:Choice>
-        <mc:Fallback>
+        <mc:Fallback xmlns="">
           <p:sp>
             <p:nvSpPr>
               <p:cNvPr id="5" name="TextBox 4">
@@ -11791,8 +11772,8 @@
           </p:sp>
         </mc:Fallback>
       </mc:AlternateContent>
-      <mc:AlternateContent xmlns:mc="http://schemas.openxmlformats.org/markup-compatibility/2006">
-        <mc:Choice xmlns:a14="http://schemas.microsoft.com/office/drawing/2010/main" Requires="a14">
+      <mc:AlternateContent xmlns:mc="http://schemas.openxmlformats.org/markup-compatibility/2006" xmlns:a14="http://schemas.microsoft.com/office/drawing/2010/main">
+        <mc:Choice Requires="a14">
           <p:sp>
             <p:nvSpPr>
               <p:cNvPr id="6" name="TextBox 5">
@@ -12201,7 +12182,7 @@
             </p:txBody>
           </p:sp>
         </mc:Choice>
-        <mc:Fallback>
+        <mc:Fallback xmlns="">
           <p:sp>
             <p:nvSpPr>
               <p:cNvPr id="6" name="TextBox 5">
@@ -12246,8 +12227,8 @@
           </p:sp>
         </mc:Fallback>
       </mc:AlternateContent>
-      <mc:AlternateContent xmlns:mc="http://schemas.openxmlformats.org/markup-compatibility/2006">
-        <mc:Choice xmlns:a14="http://schemas.microsoft.com/office/drawing/2010/main" Requires="a14">
+      <mc:AlternateContent xmlns:mc="http://schemas.openxmlformats.org/markup-compatibility/2006" xmlns:a14="http://schemas.microsoft.com/office/drawing/2010/main">
+        <mc:Choice Requires="a14">
           <p:sp>
             <p:nvSpPr>
               <p:cNvPr id="8" name="TextBox 7">
@@ -12649,7 +12630,7 @@
             </p:txBody>
           </p:sp>
         </mc:Choice>
-        <mc:Fallback>
+        <mc:Fallback xmlns="">
           <p:sp>
             <p:nvSpPr>
               <p:cNvPr id="8" name="TextBox 7">
@@ -12694,8 +12675,8 @@
           </p:sp>
         </mc:Fallback>
       </mc:AlternateContent>
-      <mc:AlternateContent xmlns:mc="http://schemas.openxmlformats.org/markup-compatibility/2006">
-        <mc:Choice xmlns:a14="http://schemas.microsoft.com/office/drawing/2010/main" Requires="a14">
+      <mc:AlternateContent xmlns:mc="http://schemas.openxmlformats.org/markup-compatibility/2006" xmlns:a14="http://schemas.microsoft.com/office/drawing/2010/main">
+        <mc:Choice Requires="a14">
           <p:sp>
             <p:nvSpPr>
               <p:cNvPr id="9" name="TextBox 8">
@@ -13110,7 +13091,7 @@
             </p:txBody>
           </p:sp>
         </mc:Choice>
-        <mc:Fallback>
+        <mc:Fallback xmlns="">
           <p:sp>
             <p:nvSpPr>
               <p:cNvPr id="9" name="TextBox 8">
@@ -13155,8 +13136,8 @@
           </p:sp>
         </mc:Fallback>
       </mc:AlternateContent>
-      <mc:AlternateContent xmlns:mc="http://schemas.openxmlformats.org/markup-compatibility/2006">
-        <mc:Choice xmlns:a14="http://schemas.microsoft.com/office/drawing/2010/main" Requires="a14">
+      <mc:AlternateContent xmlns:mc="http://schemas.openxmlformats.org/markup-compatibility/2006" xmlns:a14="http://schemas.microsoft.com/office/drawing/2010/main">
+        <mc:Choice Requires="a14">
           <p:sp>
             <p:nvSpPr>
               <p:cNvPr id="10" name="TextBox 9">
@@ -13548,7 +13529,7 @@
             </p:txBody>
           </p:sp>
         </mc:Choice>
-        <mc:Fallback>
+        <mc:Fallback xmlns="">
           <p:sp>
             <p:nvSpPr>
               <p:cNvPr id="10" name="TextBox 9">
@@ -13852,8 +13833,8 @@
           <a:chExt cx="0" cy="0"/>
         </a:xfrm>
       </p:grpSpPr>
-      <mc:AlternateContent xmlns:mc="http://schemas.openxmlformats.org/markup-compatibility/2006">
-        <mc:Choice xmlns:a14="http://schemas.microsoft.com/office/drawing/2010/main" Requires="a14">
+      <mc:AlternateContent xmlns:mc="http://schemas.openxmlformats.org/markup-compatibility/2006" xmlns:a14="http://schemas.microsoft.com/office/drawing/2010/main">
+        <mc:Choice Requires="a14">
           <p:sp>
             <p:nvSpPr>
               <p:cNvPr id="2" name="TextBox 1">
@@ -13957,13 +13938,7 @@
                         <a:rPr lang="tr-TR" b="0" i="1" smtClean="0">
                           <a:latin typeface="Cambria Math" panose="02040503050406030204" pitchFamily="18" charset="0"/>
                         </a:rPr>
-                        <m:t>=</m:t>
-                      </m:r>
-                      <m:r>
-                        <a:rPr lang="tr-TR" b="0" i="1" smtClean="0">
-                          <a:latin typeface="Cambria Math" panose="02040503050406030204" pitchFamily="18" charset="0"/>
-                        </a:rPr>
-                        <m:t>−</m:t>
+                        <m:t>=−</m:t>
                       </m:r>
                       <m:r>
                         <a:rPr lang="tr-TR" b="0" i="1" smtClean="0">
@@ -14247,7 +14222,7 @@
             </p:txBody>
           </p:sp>
         </mc:Choice>
-        <mc:Fallback>
+        <mc:Fallback xmlns="">
           <p:sp>
             <p:nvSpPr>
               <p:cNvPr id="2" name="TextBox 1">
@@ -14292,8 +14267,8 @@
           </p:sp>
         </mc:Fallback>
       </mc:AlternateContent>
-      <mc:AlternateContent xmlns:mc="http://schemas.openxmlformats.org/markup-compatibility/2006">
-        <mc:Choice xmlns:a14="http://schemas.microsoft.com/office/drawing/2010/main" Requires="a14">
+      <mc:AlternateContent xmlns:mc="http://schemas.openxmlformats.org/markup-compatibility/2006" xmlns:a14="http://schemas.microsoft.com/office/drawing/2010/main">
+        <mc:Choice Requires="a14">
           <p:sp>
             <p:nvSpPr>
               <p:cNvPr id="3" name="TextBox 2">
@@ -14629,7 +14604,7 @@
             </p:txBody>
           </p:sp>
         </mc:Choice>
-        <mc:Fallback>
+        <mc:Fallback xmlns="">
           <p:sp>
             <p:nvSpPr>
               <p:cNvPr id="3" name="TextBox 2">
@@ -14715,8 +14690,8 @@
           </a:fontRef>
         </p:style>
       </p:cxnSp>
-      <mc:AlternateContent xmlns:mc="http://schemas.openxmlformats.org/markup-compatibility/2006">
-        <mc:Choice xmlns:a14="http://schemas.microsoft.com/office/drawing/2010/main" Requires="a14">
+      <mc:AlternateContent xmlns:mc="http://schemas.openxmlformats.org/markup-compatibility/2006" xmlns:a14="http://schemas.microsoft.com/office/drawing/2010/main">
+        <mc:Choice Requires="a14">
           <p:sp>
             <p:nvSpPr>
               <p:cNvPr id="7" name="TextBox 6">
@@ -14745,6 +14720,7 @@
               </a:bodyPr>
               <a:lstStyle/>
               <a:p>
+                <a:pPr/>
                 <a14:m>
                   <m:oMathPara xmlns:m="http://schemas.openxmlformats.org/officeDocument/2006/math">
                     <m:oMathParaPr>
@@ -14852,7 +14828,7 @@
             </p:txBody>
           </p:sp>
         </mc:Choice>
-        <mc:Fallback>
+        <mc:Fallback xmlns="">
           <p:sp>
             <p:nvSpPr>
               <p:cNvPr id="7" name="TextBox 6">
@@ -14897,8 +14873,8 @@
           </p:sp>
         </mc:Fallback>
       </mc:AlternateContent>
-      <mc:AlternateContent xmlns:mc="http://schemas.openxmlformats.org/markup-compatibility/2006">
-        <mc:Choice xmlns:a14="http://schemas.microsoft.com/office/drawing/2010/main" Requires="a14">
+      <mc:AlternateContent xmlns:mc="http://schemas.openxmlformats.org/markup-compatibility/2006" xmlns:a14="http://schemas.microsoft.com/office/drawing/2010/main">
+        <mc:Choice Requires="a14">
           <p:sp>
             <p:nvSpPr>
               <p:cNvPr id="8" name="TextBox 7">
@@ -14927,6 +14903,7 @@
               </a:bodyPr>
               <a:lstStyle/>
               <a:p>
+                <a:pPr/>
                 <a14:m>
                   <m:oMathPara xmlns:m="http://schemas.openxmlformats.org/officeDocument/2006/math">
                     <m:oMathParaPr>
@@ -15034,7 +15011,7 @@
             </p:txBody>
           </p:sp>
         </mc:Choice>
-        <mc:Fallback>
+        <mc:Fallback xmlns="">
           <p:sp>
             <p:nvSpPr>
               <p:cNvPr id="8" name="TextBox 7">
@@ -15079,8 +15056,8 @@
           </p:sp>
         </mc:Fallback>
       </mc:AlternateContent>
-      <mc:AlternateContent xmlns:mc="http://schemas.openxmlformats.org/markup-compatibility/2006">
-        <mc:Choice xmlns:a14="http://schemas.microsoft.com/office/drawing/2010/main" Requires="a14">
+      <mc:AlternateContent xmlns:mc="http://schemas.openxmlformats.org/markup-compatibility/2006" xmlns:a14="http://schemas.microsoft.com/office/drawing/2010/main">
+        <mc:Choice Requires="a14">
           <p:sp>
             <p:nvSpPr>
               <p:cNvPr id="9" name="TextBox 8">
@@ -15114,7 +15091,7 @@
                     <m:sSubSup>
                       <m:sSubSupPr>
                         <m:ctrlPr>
-                          <a:rPr lang="tr-TR" b="0" i="0" smtClean="0">
+                          <a:rPr lang="tr-TR" b="0" i="1" smtClean="0">
                             <a:latin typeface="Cambria Math" panose="02040503050406030204" pitchFamily="18" charset="0"/>
                           </a:rPr>
                         </m:ctrlPr>
@@ -15153,7 +15130,7 @@
                     <m:sSubSup>
                       <m:sSubSupPr>
                         <m:ctrlPr>
-                          <a:rPr lang="tr-TR" b="0" i="0" smtClean="0">
+                          <a:rPr lang="tr-TR" b="0" i="1" smtClean="0">
                             <a:latin typeface="Cambria Math" panose="02040503050406030204" pitchFamily="18" charset="0"/>
                           </a:rPr>
                         </m:ctrlPr>
@@ -15195,7 +15172,7 @@
                     <m:sSub>
                       <m:sSubPr>
                         <m:ctrlPr>
-                          <a:rPr lang="tr-TR" b="0" i="0" smtClean="0">
+                          <a:rPr lang="tr-TR" b="0" i="1" smtClean="0">
                             <a:latin typeface="Cambria Math" panose="02040503050406030204" pitchFamily="18" charset="0"/>
                           </a:rPr>
                         </m:ctrlPr>
@@ -15223,7 +15200,7 @@
                     <m:sSub>
                       <m:sSubPr>
                         <m:ctrlPr>
-                          <a:rPr lang="tr-TR" b="0" i="0" smtClean="0">
+                          <a:rPr lang="tr-TR" b="0" i="1" smtClean="0">
                             <a:latin typeface="Cambria Math" panose="02040503050406030204" pitchFamily="18" charset="0"/>
                           </a:rPr>
                         </m:ctrlPr>
@@ -15260,7 +15237,7 @@
                     <m:d>
                       <m:dPr>
                         <m:ctrlPr>
-                          <a:rPr lang="tr-TR" b="0" i="0" smtClean="0">
+                          <a:rPr lang="tr-TR" b="0" i="1" smtClean="0">
                             <a:latin typeface="Cambria Math" panose="02040503050406030204" pitchFamily="18" charset="0"/>
                           </a:rPr>
                         </m:ctrlPr>
@@ -15331,7 +15308,7 @@
                     <m:sSubSup>
                       <m:sSubSupPr>
                         <m:ctrlPr>
-                          <a:rPr lang="tr-TR" b="0" i="0" smtClean="0">
+                          <a:rPr lang="tr-TR" b="0" i="1" smtClean="0">
                             <a:latin typeface="Cambria Math" panose="02040503050406030204" pitchFamily="18" charset="0"/>
                           </a:rPr>
                         </m:ctrlPr>
@@ -15378,7 +15355,7 @@
             </p:txBody>
           </p:sp>
         </mc:Choice>
-        <mc:Fallback>
+        <mc:Fallback xmlns="">
           <p:sp>
             <p:nvSpPr>
               <p:cNvPr id="9" name="TextBox 8">
@@ -15464,8 +15441,8 @@
           </a:fontRef>
         </p:style>
       </p:cxnSp>
-      <mc:AlternateContent xmlns:mc="http://schemas.openxmlformats.org/markup-compatibility/2006">
-        <mc:Choice xmlns:a14="http://schemas.microsoft.com/office/drawing/2010/main" Requires="a14">
+      <mc:AlternateContent xmlns:mc="http://schemas.openxmlformats.org/markup-compatibility/2006" xmlns:a14="http://schemas.microsoft.com/office/drawing/2010/main">
+        <mc:Choice Requires="a14">
           <p:sp>
             <p:nvSpPr>
               <p:cNvPr id="11" name="TextBox 10">
@@ -15494,6 +15471,7 @@
               </a:bodyPr>
               <a:lstStyle/>
               <a:p>
+                <a:pPr/>
                 <a14:m>
                   <m:oMathPara xmlns:m="http://schemas.openxmlformats.org/officeDocument/2006/math">
                     <m:oMathParaPr>
@@ -15512,7 +15490,7 @@
                       <m:d>
                         <m:dPr>
                           <m:ctrlPr>
-                            <a:rPr lang="tr-TR" b="0" i="0" smtClean="0">
+                            <a:rPr lang="tr-TR" b="0" i="1" smtClean="0">
                               <a:latin typeface="Cambria Math" panose="02040503050406030204" pitchFamily="18" charset="0"/>
                             </a:rPr>
                           </m:ctrlPr>
@@ -15583,7 +15561,7 @@
                       <m:f>
                         <m:fPr>
                           <m:ctrlPr>
-                            <a:rPr lang="tr-TR" b="0" i="0" smtClean="0">
+                            <a:rPr lang="tr-TR" b="0" i="1" smtClean="0">
                               <a:latin typeface="Cambria Math" panose="02040503050406030204" pitchFamily="18" charset="0"/>
                             </a:rPr>
                           </m:ctrlPr>
@@ -15783,7 +15761,7 @@
             </p:txBody>
           </p:sp>
         </mc:Choice>
-        <mc:Fallback>
+        <mc:Fallback xmlns="">
           <p:sp>
             <p:nvSpPr>
               <p:cNvPr id="11" name="TextBox 10">
@@ -15869,8 +15847,8 @@
           </a:fontRef>
         </p:style>
       </p:cxnSp>
-      <mc:AlternateContent xmlns:mc="http://schemas.openxmlformats.org/markup-compatibility/2006">
-        <mc:Choice xmlns:a14="http://schemas.microsoft.com/office/drawing/2010/main" Requires="a14">
+      <mc:AlternateContent xmlns:mc="http://schemas.openxmlformats.org/markup-compatibility/2006" xmlns:a14="http://schemas.microsoft.com/office/drawing/2010/main">
+        <mc:Choice Requires="a14">
           <p:sp>
             <p:nvSpPr>
               <p:cNvPr id="13" name="TextBox 12">
@@ -15899,6 +15877,7 @@
               </a:bodyPr>
               <a:lstStyle/>
               <a:p>
+                <a:pPr/>
                 <a14:m>
                   <m:oMathPara xmlns:m="http://schemas.openxmlformats.org/officeDocument/2006/math">
                     <m:oMathParaPr>
@@ -15908,7 +15887,7 @@
                       <m:d>
                         <m:dPr>
                           <m:ctrlPr>
-                            <a:rPr lang="tr-TR" b="0" i="0" smtClean="0">
+                            <a:rPr lang="tr-TR" b="0" i="1" smtClean="0">
                               <a:latin typeface="Cambria Math" panose="02040503050406030204" pitchFamily="18" charset="0"/>
                             </a:rPr>
                           </m:ctrlPr>
@@ -15994,7 +15973,7 @@
                       <m:f>
                         <m:fPr>
                           <m:ctrlPr>
-                            <a:rPr lang="tr-TR" b="0" i="0" smtClean="0">
+                            <a:rPr lang="tr-TR" b="0" i="1" smtClean="0">
                               <a:latin typeface="Cambria Math" panose="02040503050406030204" pitchFamily="18" charset="0"/>
                             </a:rPr>
                           </m:ctrlPr>
@@ -16200,7 +16179,7 @@
             </p:txBody>
           </p:sp>
         </mc:Choice>
-        <mc:Fallback>
+        <mc:Fallback xmlns="">
           <p:sp>
             <p:nvSpPr>
               <p:cNvPr id="13" name="TextBox 12">
@@ -16275,8 +16254,8 @@
           <a:chExt cx="0" cy="0"/>
         </a:xfrm>
       </p:grpSpPr>
-      <mc:AlternateContent xmlns:mc="http://schemas.openxmlformats.org/markup-compatibility/2006">
-        <mc:Choice xmlns:a14="http://schemas.microsoft.com/office/drawing/2010/main" Requires="a14">
+      <mc:AlternateContent xmlns:mc="http://schemas.openxmlformats.org/markup-compatibility/2006" xmlns:a14="http://schemas.microsoft.com/office/drawing/2010/main">
+        <mc:Choice Requires="a14">
           <p:sp>
             <p:nvSpPr>
               <p:cNvPr id="2" name="TextBox 1">
@@ -16394,13 +16373,7 @@
                         <a:rPr lang="tr-TR" b="0" i="1" smtClean="0">
                           <a:latin typeface="Cambria Math" panose="02040503050406030204" pitchFamily="18" charset="0"/>
                         </a:rPr>
-                        <m:t> </m:t>
-                      </m:r>
-                      <m:r>
-                        <a:rPr lang="tr-TR" b="0" i="1" smtClean="0">
-                          <a:latin typeface="Cambria Math" panose="02040503050406030204" pitchFamily="18" charset="0"/>
-                        </a:rPr>
-                        <m:t>=−</m:t>
+                        <m:t> =−</m:t>
                       </m:r>
                       <m:f>
                         <m:fPr>
@@ -16547,7 +16520,7 @@
             </p:txBody>
           </p:sp>
         </mc:Choice>
-        <mc:Fallback>
+        <mc:Fallback xmlns="">
           <p:sp>
             <p:nvSpPr>
               <p:cNvPr id="2" name="TextBox 1">
@@ -16592,8 +16565,8 @@
           </p:sp>
         </mc:Fallback>
       </mc:AlternateContent>
-      <mc:AlternateContent xmlns:mc="http://schemas.openxmlformats.org/markup-compatibility/2006">
-        <mc:Choice xmlns:a14="http://schemas.microsoft.com/office/drawing/2010/main" Requires="a14">
+      <mc:AlternateContent xmlns:mc="http://schemas.openxmlformats.org/markup-compatibility/2006" xmlns:a14="http://schemas.microsoft.com/office/drawing/2010/main">
+        <mc:Choice Requires="a14">
           <p:sp>
             <p:nvSpPr>
               <p:cNvPr id="3" name="TextBox 2">
@@ -16631,7 +16604,7 @@
                     <m:d>
                       <m:dPr>
                         <m:ctrlPr>
-                          <a:rPr lang="tr-TR" b="0" i="0" smtClean="0">
+                          <a:rPr lang="tr-TR" b="0" i="1" smtClean="0">
                             <a:latin typeface="Cambria Math" panose="02040503050406030204" pitchFamily="18" charset="0"/>
                           </a:rPr>
                         </m:ctrlPr>
@@ -16687,7 +16660,7 @@
                     <m:f>
                       <m:fPr>
                         <m:ctrlPr>
-                          <a:rPr lang="tr-TR" b="0" i="0" smtClean="0">
+                          <a:rPr lang="tr-TR" b="0" i="1" smtClean="0">
                             <a:latin typeface="Cambria Math" panose="02040503050406030204" pitchFamily="18" charset="0"/>
                           </a:rPr>
                         </m:ctrlPr>
@@ -16892,7 +16865,7 @@
             </p:txBody>
           </p:sp>
         </mc:Choice>
-        <mc:Fallback>
+        <mc:Fallback xmlns="">
           <p:sp>
             <p:nvSpPr>
               <p:cNvPr id="3" name="TextBox 2">
@@ -16978,8 +16951,8 @@
           </a:fontRef>
         </p:style>
       </p:cxnSp>
-      <mc:AlternateContent xmlns:mc="http://schemas.openxmlformats.org/markup-compatibility/2006">
-        <mc:Choice xmlns:a14="http://schemas.microsoft.com/office/drawing/2010/main" Requires="a14">
+      <mc:AlternateContent xmlns:mc="http://schemas.openxmlformats.org/markup-compatibility/2006" xmlns:a14="http://schemas.microsoft.com/office/drawing/2010/main">
+        <mc:Choice Requires="a14">
           <p:sp>
             <p:nvSpPr>
               <p:cNvPr id="7" name="TextBox 6">
@@ -17109,13 +17082,7 @@
                         <a:rPr lang="tr-TR" b="0" i="1" smtClean="0">
                           <a:latin typeface="Cambria Math" panose="02040503050406030204" pitchFamily="18" charset="0"/>
                         </a:rPr>
-                        <m:t> </m:t>
-                      </m:r>
-                      <m:r>
-                        <a:rPr lang="tr-TR" b="0" i="1" smtClean="0">
-                          <a:latin typeface="Cambria Math" panose="02040503050406030204" pitchFamily="18" charset="0"/>
-                        </a:rPr>
-                        <m:t>=−</m:t>
+                        <m:t> =−</m:t>
                       </m:r>
                       <m:f>
                         <m:fPr>
@@ -17262,7 +17229,7 @@
             </p:txBody>
           </p:sp>
         </mc:Choice>
-        <mc:Fallback>
+        <mc:Fallback xmlns="">
           <p:sp>
             <p:nvSpPr>
               <p:cNvPr id="7" name="TextBox 6">
@@ -17307,8 +17274,8 @@
           </p:sp>
         </mc:Fallback>
       </mc:AlternateContent>
-      <mc:AlternateContent xmlns:mc="http://schemas.openxmlformats.org/markup-compatibility/2006">
-        <mc:Choice xmlns:a14="http://schemas.microsoft.com/office/drawing/2010/main" Requires="a14">
+      <mc:AlternateContent xmlns:mc="http://schemas.openxmlformats.org/markup-compatibility/2006" xmlns:a14="http://schemas.microsoft.com/office/drawing/2010/main">
+        <mc:Choice Requires="a14">
           <p:sp>
             <p:nvSpPr>
               <p:cNvPr id="8" name="TextBox 7">
@@ -17362,7 +17329,7 @@
             </p:txBody>
           </p:sp>
         </mc:Choice>
-        <mc:Fallback>
+        <mc:Fallback xmlns="">
           <p:sp>
             <p:nvSpPr>
               <p:cNvPr id="8" name="TextBox 7">
@@ -17448,8 +17415,8 @@
           </a:fontRef>
         </p:style>
       </p:cxnSp>
-      <mc:AlternateContent xmlns:mc="http://schemas.openxmlformats.org/markup-compatibility/2006">
-        <mc:Choice xmlns:a14="http://schemas.microsoft.com/office/drawing/2010/main" Requires="a14">
+      <mc:AlternateContent xmlns:mc="http://schemas.openxmlformats.org/markup-compatibility/2006" xmlns:a14="http://schemas.microsoft.com/office/drawing/2010/main">
+        <mc:Choice Requires="a14">
           <p:sp>
             <p:nvSpPr>
               <p:cNvPr id="11" name="TextBox 10">
@@ -17478,6 +17445,7 @@
               </a:bodyPr>
               <a:lstStyle/>
               <a:p>
+                <a:pPr/>
                 <a14:m>
                   <m:oMathPara xmlns:m="http://schemas.openxmlformats.org/officeDocument/2006/math">
                     <m:oMathParaPr>
@@ -17748,7 +17716,7 @@
             </p:txBody>
           </p:sp>
         </mc:Choice>
-        <mc:Fallback>
+        <mc:Fallback xmlns="">
           <p:sp>
             <p:nvSpPr>
               <p:cNvPr id="11" name="TextBox 10">
@@ -17832,8 +17800,8 @@
           </a:fontRef>
         </p:style>
       </p:cxnSp>
-      <mc:AlternateContent xmlns:mc="http://schemas.openxmlformats.org/markup-compatibility/2006">
-        <mc:Choice xmlns:a14="http://schemas.microsoft.com/office/drawing/2010/main" Requires="a14">
+      <mc:AlternateContent xmlns:mc="http://schemas.openxmlformats.org/markup-compatibility/2006" xmlns:a14="http://schemas.microsoft.com/office/drawing/2010/main">
+        <mc:Choice Requires="a14">
           <p:sp>
             <p:nvSpPr>
               <p:cNvPr id="14" name="TextBox 13">
@@ -17862,7 +17830,6 @@
               </a:bodyPr>
               <a:lstStyle/>
               <a:p>
-                <a:pPr/>
                 <a14:m>
                   <m:oMath xmlns:m="http://schemas.openxmlformats.org/officeDocument/2006/math">
                     <m:r>
@@ -18120,7 +18087,7 @@
             </p:txBody>
           </p:sp>
         </mc:Choice>
-        <mc:Fallback>
+        <mc:Fallback xmlns="">
           <p:sp>
             <p:nvSpPr>
               <p:cNvPr id="14" name="TextBox 13">
@@ -18195,8 +18162,8 @@
           <a:chExt cx="0" cy="0"/>
         </a:xfrm>
       </p:grpSpPr>
-      <mc:AlternateContent xmlns:mc="http://schemas.openxmlformats.org/markup-compatibility/2006">
-        <mc:Choice xmlns:a14="http://schemas.microsoft.com/office/drawing/2010/main" Requires="a14">
+      <mc:AlternateContent xmlns:mc="http://schemas.openxmlformats.org/markup-compatibility/2006" xmlns:a14="http://schemas.microsoft.com/office/drawing/2010/main">
+        <mc:Choice Requires="a14">
           <p:sp>
             <p:nvSpPr>
               <p:cNvPr id="3" name="TextBox 2">
@@ -18605,7 +18572,7 @@
             </p:txBody>
           </p:sp>
         </mc:Choice>
-        <mc:Fallback>
+        <mc:Fallback xmlns="">
           <p:sp>
             <p:nvSpPr>
               <p:cNvPr id="3" name="TextBox 2">
@@ -18650,8 +18617,8 @@
           </p:sp>
         </mc:Fallback>
       </mc:AlternateContent>
-      <mc:AlternateContent xmlns:mc="http://schemas.openxmlformats.org/markup-compatibility/2006">
-        <mc:Choice xmlns:a14="http://schemas.microsoft.com/office/drawing/2010/main" Requires="a14">
+      <mc:AlternateContent xmlns:mc="http://schemas.openxmlformats.org/markup-compatibility/2006" xmlns:a14="http://schemas.microsoft.com/office/drawing/2010/main">
+        <mc:Choice Requires="a14">
           <p:sp>
             <p:nvSpPr>
               <p:cNvPr id="4" name="TextBox 3">
@@ -19053,7 +19020,7 @@
             </p:txBody>
           </p:sp>
         </mc:Choice>
-        <mc:Fallback>
+        <mc:Fallback xmlns="">
           <p:sp>
             <p:nvSpPr>
               <p:cNvPr id="4" name="TextBox 3">
@@ -19098,8 +19065,8 @@
           </p:sp>
         </mc:Fallback>
       </mc:AlternateContent>
-      <mc:AlternateContent xmlns:mc="http://schemas.openxmlformats.org/markup-compatibility/2006">
-        <mc:Choice xmlns:a14="http://schemas.microsoft.com/office/drawing/2010/main" Requires="a14">
+      <mc:AlternateContent xmlns:mc="http://schemas.openxmlformats.org/markup-compatibility/2006" xmlns:a14="http://schemas.microsoft.com/office/drawing/2010/main">
+        <mc:Choice Requires="a14">
           <p:sp>
             <p:nvSpPr>
               <p:cNvPr id="5" name="TextBox 4">
@@ -19514,7 +19481,7 @@
             </p:txBody>
           </p:sp>
         </mc:Choice>
-        <mc:Fallback>
+        <mc:Fallback xmlns="">
           <p:sp>
             <p:nvSpPr>
               <p:cNvPr id="5" name="TextBox 4">
@@ -19559,8 +19526,8 @@
           </p:sp>
         </mc:Fallback>
       </mc:AlternateContent>
-      <mc:AlternateContent xmlns:mc="http://schemas.openxmlformats.org/markup-compatibility/2006">
-        <mc:Choice xmlns:a14="http://schemas.microsoft.com/office/drawing/2010/main" Requires="a14">
+      <mc:AlternateContent xmlns:mc="http://schemas.openxmlformats.org/markup-compatibility/2006" xmlns:a14="http://schemas.microsoft.com/office/drawing/2010/main">
+        <mc:Choice Requires="a14">
           <p:sp>
             <p:nvSpPr>
               <p:cNvPr id="6" name="TextBox 5">
@@ -19952,7 +19919,7 @@
             </p:txBody>
           </p:sp>
         </mc:Choice>
-        <mc:Fallback>
+        <mc:Fallback xmlns="">
           <p:sp>
             <p:nvSpPr>
               <p:cNvPr id="6" name="TextBox 5">

</xml_diff>